<commit_message>
Deploying to main from @ ang-zeyu/morsels@0be8b8a37fc9146aa7d239006a7368a2e70b275b 🚀
</commit_message>
<xml_diff>
--- a/morsels/images/architecture.pptx
+++ b/morsels/images/architecture.pptx
@@ -261,7 +261,7 @@
           <a:p>
             <a:fld id="{4B3D9AB3-1BEE-469F-B79E-0D7A28C81A9F}" type="datetimeFigureOut">
               <a:rPr lang="en-SG" smtClean="0"/>
-              <a:t>17/5/2022</a:t>
+              <a:t>24/7/2022</a:t>
             </a:fld>
             <a:endParaRPr lang="en-SG"/>
           </a:p>
@@ -461,7 +461,7 @@
           <a:p>
             <a:fld id="{4B3D9AB3-1BEE-469F-B79E-0D7A28C81A9F}" type="datetimeFigureOut">
               <a:rPr lang="en-SG" smtClean="0"/>
-              <a:t>17/5/2022</a:t>
+              <a:t>24/7/2022</a:t>
             </a:fld>
             <a:endParaRPr lang="en-SG"/>
           </a:p>
@@ -671,7 +671,7 @@
           <a:p>
             <a:fld id="{4B3D9AB3-1BEE-469F-B79E-0D7A28C81A9F}" type="datetimeFigureOut">
               <a:rPr lang="en-SG" smtClean="0"/>
-              <a:t>17/5/2022</a:t>
+              <a:t>24/7/2022</a:t>
             </a:fld>
             <a:endParaRPr lang="en-SG"/>
           </a:p>
@@ -871,7 +871,7 @@
           <a:p>
             <a:fld id="{4B3D9AB3-1BEE-469F-B79E-0D7A28C81A9F}" type="datetimeFigureOut">
               <a:rPr lang="en-SG" smtClean="0"/>
-              <a:t>17/5/2022</a:t>
+              <a:t>24/7/2022</a:t>
             </a:fld>
             <a:endParaRPr lang="en-SG"/>
           </a:p>
@@ -1147,7 +1147,7 @@
           <a:p>
             <a:fld id="{4B3D9AB3-1BEE-469F-B79E-0D7A28C81A9F}" type="datetimeFigureOut">
               <a:rPr lang="en-SG" smtClean="0"/>
-              <a:t>17/5/2022</a:t>
+              <a:t>24/7/2022</a:t>
             </a:fld>
             <a:endParaRPr lang="en-SG"/>
           </a:p>
@@ -1415,7 +1415,7 @@
           <a:p>
             <a:fld id="{4B3D9AB3-1BEE-469F-B79E-0D7A28C81A9F}" type="datetimeFigureOut">
               <a:rPr lang="en-SG" smtClean="0"/>
-              <a:t>17/5/2022</a:t>
+              <a:t>24/7/2022</a:t>
             </a:fld>
             <a:endParaRPr lang="en-SG"/>
           </a:p>
@@ -1830,7 +1830,7 @@
           <a:p>
             <a:fld id="{4B3D9AB3-1BEE-469F-B79E-0D7A28C81A9F}" type="datetimeFigureOut">
               <a:rPr lang="en-SG" smtClean="0"/>
-              <a:t>17/5/2022</a:t>
+              <a:t>24/7/2022</a:t>
             </a:fld>
             <a:endParaRPr lang="en-SG"/>
           </a:p>
@@ -1972,7 +1972,7 @@
           <a:p>
             <a:fld id="{4B3D9AB3-1BEE-469F-B79E-0D7A28C81A9F}" type="datetimeFigureOut">
               <a:rPr lang="en-SG" smtClean="0"/>
-              <a:t>17/5/2022</a:t>
+              <a:t>24/7/2022</a:t>
             </a:fld>
             <a:endParaRPr lang="en-SG"/>
           </a:p>
@@ -2085,7 +2085,7 @@
           <a:p>
             <a:fld id="{4B3D9AB3-1BEE-469F-B79E-0D7A28C81A9F}" type="datetimeFigureOut">
               <a:rPr lang="en-SG" smtClean="0"/>
-              <a:t>17/5/2022</a:t>
+              <a:t>24/7/2022</a:t>
             </a:fld>
             <a:endParaRPr lang="en-SG"/>
           </a:p>
@@ -2398,7 +2398,7 @@
           <a:p>
             <a:fld id="{4B3D9AB3-1BEE-469F-B79E-0D7A28C81A9F}" type="datetimeFigureOut">
               <a:rPr lang="en-SG" smtClean="0"/>
-              <a:t>17/5/2022</a:t>
+              <a:t>24/7/2022</a:t>
             </a:fld>
             <a:endParaRPr lang="en-SG"/>
           </a:p>
@@ -2687,7 +2687,7 @@
           <a:p>
             <a:fld id="{4B3D9AB3-1BEE-469F-B79E-0D7A28C81A9F}" type="datetimeFigureOut">
               <a:rPr lang="en-SG" smtClean="0"/>
-              <a:t>17/5/2022</a:t>
+              <a:t>24/7/2022</a:t>
             </a:fld>
             <a:endParaRPr lang="en-SG"/>
           </a:p>
@@ -2930,7 +2930,7 @@
           <a:p>
             <a:fld id="{4B3D9AB3-1BEE-469F-B79E-0D7A28C81A9F}" type="datetimeFigureOut">
               <a:rPr lang="en-SG" smtClean="0"/>
-              <a:t>17/5/2022</a:t>
+              <a:t>24/7/2022</a:t>
             </a:fld>
             <a:endParaRPr lang="en-SG"/>
           </a:p>
@@ -3361,8 +3361,8 @@
         </p:nvSpPr>
         <p:spPr>
           <a:xfrm>
-            <a:off x="525294" y="390726"/>
-            <a:ext cx="1880680" cy="1267841"/>
+            <a:off x="620951" y="1028288"/>
+            <a:ext cx="1880680" cy="870068"/>
           </a:xfrm>
           <a:prstGeom prst="roundRect">
             <a:avLst/>
@@ -3391,7 +3391,7 @@
           <a:p>
             <a:pPr algn="ctr"/>
             <a:r>
-              <a:rPr lang="en-SG" dirty="0">
+              <a:rPr lang="en-SG" u="sng" dirty="0">
                 <a:solidFill>
                   <a:schemeClr val="bg2">
                     <a:lumMod val="10000"/>
@@ -3400,10 +3400,7 @@
               </a:rPr>
               <a:t>Corpus</a:t>
             </a:r>
-          </a:p>
-          <a:p>
-            <a:pPr algn="ctr"/>
-            <a:endParaRPr lang="en-SG" dirty="0">
+            <a:endParaRPr lang="en-SG" u="sng" dirty="0">
               <a:solidFill>
                 <a:schemeClr val="tx1"/>
               </a:solidFill>
@@ -3436,17 +3433,14 @@
         </p:nvSpPr>
         <p:spPr>
           <a:xfrm>
-            <a:off x="3135550" y="726332"/>
+            <a:off x="3135550" y="1165140"/>
             <a:ext cx="1880680" cy="596630"/>
           </a:xfrm>
           <a:prstGeom prst="roundRect">
             <a:avLst/>
           </a:prstGeom>
           <a:solidFill>
-            <a:schemeClr val="accent4">
-              <a:lumMod val="40000"/>
-              <a:lumOff val="60000"/>
-            </a:schemeClr>
+            <a:srgbClr val="F0BEE6"/>
           </a:solidFill>
           <a:ln>
             <a:noFill/>
@@ -3472,20 +3466,12 @@
           <a:p>
             <a:pPr algn="ctr"/>
             <a:r>
-              <a:rPr lang="en-SG" b="1" dirty="0" err="1">
-                <a:solidFill>
-                  <a:schemeClr val="tx1"/>
-                </a:solidFill>
-              </a:rPr>
-              <a:t>Cli</a:t>
-            </a:r>
-            <a:r>
               <a:rPr lang="en-SG" b="1" dirty="0">
                 <a:solidFill>
                   <a:schemeClr val="tx1"/>
                 </a:solidFill>
               </a:rPr>
-              <a:t> indexer tool</a:t>
+              <a:t>CLI indexer tool</a:t>
             </a:r>
           </a:p>
         </p:txBody>
@@ -3508,8 +3494,8 @@
         </p:nvCxnSpPr>
         <p:spPr>
           <a:xfrm>
-            <a:off x="2405974" y="1024647"/>
-            <a:ext cx="729576" cy="0"/>
+            <a:off x="2501631" y="1463322"/>
+            <a:ext cx="633919" cy="133"/>
           </a:xfrm>
           <a:prstGeom prst="straightConnector1">
             <a:avLst/>
@@ -3587,9 +3573,7 @@
             <a:r>
               <a:rPr lang="en-SG" b="1" dirty="0">
                 <a:solidFill>
-                  <a:schemeClr val="accent6">
-                    <a:lumMod val="75000"/>
-                  </a:schemeClr>
+                  <a:schemeClr val="tx1"/>
                 </a:solidFill>
               </a:rPr>
               <a:t>Index</a:t>
@@ -3600,9 +3584,7 @@
             <a:r>
               <a:rPr lang="en-SG" b="1" dirty="0">
                 <a:solidFill>
-                  <a:schemeClr val="accent6">
-                    <a:lumMod val="75000"/>
-                  </a:schemeClr>
+                  <a:schemeClr val="tx1"/>
                 </a:solidFill>
               </a:rPr>
               <a:t>File(s)</a:t>
@@ -3625,7 +3607,7 @@
         <p:spPr>
           <a:xfrm>
             <a:off x="3135550" y="2590801"/>
-            <a:ext cx="1880680" cy="1047344"/>
+            <a:ext cx="1880680" cy="729574"/>
           </a:xfrm>
           <a:prstGeom prst="roundRect">
             <a:avLst/>
@@ -3664,9 +3646,7 @@
             <a:r>
               <a:rPr lang="en-SG" b="1" dirty="0">
                 <a:solidFill>
-                  <a:schemeClr val="accent4">
-                    <a:lumMod val="75000"/>
-                  </a:schemeClr>
+                  <a:schemeClr val="tx1"/>
                 </a:solidFill>
               </a:rPr>
               <a:t>Field Stores</a:t>
@@ -3680,7 +3660,7 @@
                   <a:schemeClr val="tx1"/>
                 </a:solidFill>
               </a:rPr>
-              <a:t>(raw document fields &amp; links)</a:t>
+              <a:t>(document texts)</a:t>
             </a:r>
             <a:endParaRPr lang="en-SG" b="1" dirty="0">
               <a:solidFill>
@@ -3705,7 +3685,7 @@
         <p:spPr>
           <a:xfrm>
             <a:off x="5898204" y="2590801"/>
-            <a:ext cx="1880680" cy="917642"/>
+            <a:ext cx="1880680" cy="729574"/>
           </a:xfrm>
           <a:prstGeom prst="roundRect">
             <a:avLst/>
@@ -3742,17 +3722,6 @@
               <a:t>Metadata</a:t>
             </a:r>
           </a:p>
-          <a:p>
-            <a:pPr algn="ctr"/>
-            <a:r>
-              <a:rPr lang="en-SG" dirty="0">
-                <a:solidFill>
-                  <a:schemeClr val="tx1"/>
-                </a:solidFill>
-              </a:rPr>
-              <a:t>(configuration, dictionary)</a:t>
-            </a:r>
-          </a:p>
         </p:txBody>
       </p:sp>
       <p:cxnSp>
@@ -3772,8 +3741,8 @@
         </p:nvCxnSpPr>
         <p:spPr>
           <a:xfrm rot="5400000">
-            <a:off x="2136843" y="651753"/>
-            <a:ext cx="1267839" cy="2610256"/>
+            <a:off x="2356247" y="871157"/>
+            <a:ext cx="829031" cy="2610256"/>
           </a:xfrm>
           <a:prstGeom prst="bentConnector3">
             <a:avLst/>
@@ -3807,6 +3776,7 @@
             </a:extLst>
           </p:cNvPr>
           <p:cNvCxnSpPr>
+            <a:cxnSpLocks/>
             <a:stCxn id="15" idx="2"/>
             <a:endCxn id="25" idx="0"/>
           </p:cNvCxnSpPr>
@@ -3814,8 +3784,8 @@
         </p:nvCxnSpPr>
         <p:spPr>
           <a:xfrm rot="16200000" flipH="1">
-            <a:off x="4823298" y="575554"/>
-            <a:ext cx="1267839" cy="2762654"/>
+            <a:off x="5042702" y="794958"/>
+            <a:ext cx="829031" cy="2762654"/>
           </a:xfrm>
           <a:prstGeom prst="bentConnector3">
             <a:avLst/>
@@ -3849,6 +3819,7 @@
             </a:extLst>
           </p:cNvPr>
           <p:cNvCxnSpPr>
+            <a:cxnSpLocks/>
             <a:stCxn id="15" idx="2"/>
             <a:endCxn id="24" idx="0"/>
           </p:cNvCxnSpPr>
@@ -3856,8 +3827,8 @@
         </p:nvCxnSpPr>
         <p:spPr>
           <a:xfrm>
-            <a:off x="4075890" y="1322962"/>
-            <a:ext cx="0" cy="1267839"/>
+            <a:off x="4075890" y="1761770"/>
+            <a:ext cx="0" cy="829031"/>
           </a:xfrm>
           <a:prstGeom prst="straightConnector1">
             <a:avLst/>
@@ -3895,8 +3866,8 @@
         </p:nvSpPr>
         <p:spPr>
           <a:xfrm>
-            <a:off x="278859" y="3897548"/>
-            <a:ext cx="9656323" cy="2866417"/>
+            <a:off x="265889" y="3537626"/>
+            <a:ext cx="9137515" cy="2866417"/>
           </a:xfrm>
           <a:prstGeom prst="roundRect">
             <a:avLst>
@@ -3944,7 +3915,7 @@
         </p:nvSpPr>
         <p:spPr>
           <a:xfrm>
-            <a:off x="8466311" y="4027250"/>
+            <a:off x="8011542" y="3612869"/>
             <a:ext cx="1322959" cy="875224"/>
           </a:xfrm>
           <a:prstGeom prst="roundRect">
@@ -3953,10 +3924,7 @@
             </a:avLst>
           </a:prstGeom>
           <a:solidFill>
-            <a:schemeClr val="accent4">
-              <a:lumMod val="40000"/>
-              <a:lumOff val="60000"/>
-            </a:schemeClr>
+            <a:srgbClr val="F0BEE6"/>
           </a:solidFill>
           <a:ln>
             <a:noFill/>
@@ -3995,10 +3963,10 @@
       </p:sp>
       <p:sp>
         <p:nvSpPr>
-          <p:cNvPr id="35" name="TextBox 34">
-            <a:extLst>
-              <a:ext uri="{FF2B5EF4-FFF2-40B4-BE49-F238E27FC236}">
-                <a16:creationId xmlns:a16="http://schemas.microsoft.com/office/drawing/2014/main" id="{ACBBBEEB-9766-4E90-98AE-A7C5F8CEFFFD}"/>
+          <p:cNvPr id="36" name="TextBox 35">
+            <a:extLst>
+              <a:ext uri="{FF2B5EF4-FFF2-40B4-BE49-F238E27FC236}">
+                <a16:creationId xmlns:a16="http://schemas.microsoft.com/office/drawing/2014/main" id="{2D02167F-32CE-4EA5-99A6-B1453183AC23}"/>
               </a:ext>
             </a:extLst>
           </p:cNvPr>
@@ -4007,48 +3975,7 @@
         </p:nvSpPr>
         <p:spPr>
           <a:xfrm>
-            <a:off x="518809" y="4243439"/>
-            <a:ext cx="1297021" cy="646331"/>
-          </a:xfrm>
-          <a:prstGeom prst="rect">
-            <a:avLst/>
-          </a:prstGeom>
-          <a:noFill/>
-        </p:spPr>
-        <p:txBody>
-          <a:bodyPr wrap="square" rtlCol="0">
-            <a:spAutoFit/>
-          </a:bodyPr>
-          <a:lstStyle/>
-          <a:p>
-            <a:r>
-              <a:rPr lang="en-SG" dirty="0"/>
-              <a:t>User Query</a:t>
-            </a:r>
-          </a:p>
-          <a:p>
-            <a:r>
-              <a:rPr lang="en-SG" dirty="0"/>
-              <a:t>---------------</a:t>
-            </a:r>
-          </a:p>
-        </p:txBody>
-      </p:sp>
-      <p:sp>
-        <p:nvSpPr>
-          <p:cNvPr id="36" name="TextBox 35">
-            <a:extLst>
-              <a:ext uri="{FF2B5EF4-FFF2-40B4-BE49-F238E27FC236}">
-                <a16:creationId xmlns:a16="http://schemas.microsoft.com/office/drawing/2014/main" id="{2D02167F-32CE-4EA5-99A6-B1453183AC23}"/>
-              </a:ext>
-            </a:extLst>
-          </p:cNvPr>
-          <p:cNvSpPr txBox="1"/>
-          <p:nvPr/>
-        </p:nvSpPr>
-        <p:spPr>
-          <a:xfrm>
-            <a:off x="421533" y="5394545"/>
+            <a:off x="408563" y="5034623"/>
             <a:ext cx="1744494" cy="1200329"/>
           </a:xfrm>
           <a:prstGeom prst="rect">
@@ -4067,6 +3994,10 @@
               <a:t>Parse, Process, and figure out which </a:t>
             </a:r>
             <a:r>
+              <a:rPr lang="en-SG" b="1" dirty="0"/>
+              <a:t>index files</a:t>
+            </a:r>
+            <a:r>
               <a:rPr lang="en-SG" b="1" dirty="0">
                 <a:solidFill>
                   <a:schemeClr val="accent6">
@@ -4074,7 +4005,7 @@
                   </a:schemeClr>
                 </a:solidFill>
               </a:rPr>
-              <a:t>index files </a:t>
+              <a:t> </a:t>
             </a:r>
             <a:r>
               <a:rPr lang="en-SG" dirty="0"/>
@@ -4097,7 +4028,7 @@
         </p:nvSpPr>
         <p:spPr>
           <a:xfrm>
-            <a:off x="2863175" y="4027250"/>
+            <a:off x="2850205" y="3667328"/>
             <a:ext cx="2357336" cy="923330"/>
           </a:xfrm>
           <a:prstGeom prst="rect">
@@ -4116,25 +4047,13 @@
               <a:t>Retrieve </a:t>
             </a:r>
             <a:r>
-              <a:rPr lang="en-SG" b="1" dirty="0">
-                <a:solidFill>
-                  <a:schemeClr val="accent6">
-                    <a:lumMod val="75000"/>
-                  </a:schemeClr>
-                </a:solidFill>
-              </a:rPr>
+              <a:rPr lang="en-SG" b="1" dirty="0"/>
               <a:t>index</a:t>
             </a:r>
           </a:p>
           <a:p>
             <a:r>
-              <a:rPr lang="en-SG" b="1" dirty="0">
-                <a:solidFill>
-                  <a:schemeClr val="accent6">
-                    <a:lumMod val="75000"/>
-                  </a:schemeClr>
-                </a:solidFill>
-              </a:rPr>
+              <a:rPr lang="en-SG" b="1" dirty="0"/>
               <a:t>files</a:t>
             </a:r>
             <a:r>
@@ -4158,7 +4077,7 @@
         </p:nvSpPr>
         <p:spPr>
           <a:xfrm>
-            <a:off x="2863175" y="5463701"/>
+            <a:off x="2850205" y="5103779"/>
             <a:ext cx="1987685" cy="923330"/>
           </a:xfrm>
           <a:prstGeom prst="rect">
@@ -4193,7 +4112,7 @@
         </p:nvSpPr>
         <p:spPr>
           <a:xfrm>
-            <a:off x="5564222" y="4014279"/>
+            <a:off x="5551252" y="3654357"/>
             <a:ext cx="2658893" cy="923330"/>
           </a:xfrm>
           <a:prstGeom prst="rect">
@@ -4212,13 +4131,7 @@
               <a:t>Retrieve </a:t>
             </a:r>
             <a:r>
-              <a:rPr lang="en-SG" b="1" dirty="0">
-                <a:solidFill>
-                  <a:schemeClr val="accent4">
-                    <a:lumMod val="75000"/>
-                  </a:schemeClr>
-                </a:solidFill>
-              </a:rPr>
+              <a:rPr lang="en-SG" b="1" dirty="0"/>
               <a:t>field stores </a:t>
             </a:r>
             <a:r>
@@ -4242,7 +4155,7 @@
         </p:nvSpPr>
         <p:spPr>
           <a:xfrm>
-            <a:off x="5548008" y="5463700"/>
+            <a:off x="5535038" y="5103778"/>
             <a:ext cx="3103123" cy="1200329"/>
           </a:xfrm>
           <a:prstGeom prst="rect">
@@ -4277,9 +4190,7 @@
             <a:r>
               <a:rPr lang="en-SG" b="1" dirty="0">
                 <a:solidFill>
-                  <a:schemeClr val="accent4">
-                    <a:lumMod val="75000"/>
-                  </a:schemeClr>
+                  <a:schemeClr val="tx1"/>
                 </a:solidFill>
               </a:rPr>
               <a:t>field stores </a:t>
@@ -4327,7 +4238,7 @@
         </p:nvCxnSpPr>
         <p:spPr>
           <a:xfrm>
-            <a:off x="1050587" y="4889770"/>
+            <a:off x="1037617" y="4529848"/>
             <a:ext cx="0" cy="504775"/>
           </a:xfrm>
           <a:prstGeom prst="straightConnector1">
@@ -4366,7 +4277,7 @@
         </p:nvCxnSpPr>
         <p:spPr>
           <a:xfrm>
-            <a:off x="3699753" y="4958925"/>
+            <a:off x="3686783" y="4599003"/>
             <a:ext cx="0" cy="504775"/>
           </a:xfrm>
           <a:prstGeom prst="straightConnector1">
@@ -4405,7 +4316,7 @@
         </p:nvCxnSpPr>
         <p:spPr>
           <a:xfrm>
-            <a:off x="6663447" y="4950580"/>
+            <a:off x="6650477" y="4590658"/>
             <a:ext cx="0" cy="504775"/>
           </a:xfrm>
           <a:prstGeom prst="straightConnector1">
@@ -4447,7 +4358,7 @@
         </p:nvCxnSpPr>
         <p:spPr>
           <a:xfrm flipV="1">
-            <a:off x="2166027" y="4488915"/>
+            <a:off x="2153057" y="4128993"/>
             <a:ext cx="697148" cy="1505795"/>
           </a:xfrm>
           <a:prstGeom prst="bentConnector3">
@@ -4486,7 +4397,7 @@
         </p:nvCxnSpPr>
         <p:spPr>
           <a:xfrm flipV="1">
-            <a:off x="4781146" y="4474589"/>
+            <a:off x="4768176" y="4114667"/>
             <a:ext cx="697148" cy="1505795"/>
           </a:xfrm>
           <a:prstGeom prst="bentConnector3">
@@ -4511,6 +4422,60 @@
           </a:fontRef>
         </p:style>
       </p:cxnSp>
+      <p:sp>
+        <p:nvSpPr>
+          <p:cNvPr id="34" name="Rectangle: Rounded Corners 33">
+            <a:extLst>
+              <a:ext uri="{FF2B5EF4-FFF2-40B4-BE49-F238E27FC236}">
+                <a16:creationId xmlns:a16="http://schemas.microsoft.com/office/drawing/2014/main" id="{B7F76458-CDCA-CB28-26A6-F9E8AC9C6AD5}"/>
+              </a:ext>
+            </a:extLst>
+          </p:cNvPr>
+          <p:cNvSpPr/>
+          <p:nvPr/>
+        </p:nvSpPr>
+        <p:spPr>
+          <a:xfrm>
+            <a:off x="483957" y="3764206"/>
+            <a:ext cx="1128404" cy="729574"/>
+          </a:xfrm>
+          <a:prstGeom prst="roundRect">
+            <a:avLst/>
+          </a:prstGeom>
+          <a:noFill/>
+        </p:spPr>
+        <p:style>
+          <a:lnRef idx="2">
+            <a:schemeClr val="accent1">
+              <a:shade val="50000"/>
+            </a:schemeClr>
+          </a:lnRef>
+          <a:fillRef idx="1">
+            <a:schemeClr val="accent1"/>
+          </a:fillRef>
+          <a:effectRef idx="0">
+            <a:schemeClr val="accent1"/>
+          </a:effectRef>
+          <a:fontRef idx="minor">
+            <a:schemeClr val="lt1"/>
+          </a:fontRef>
+        </p:style>
+        <p:txBody>
+          <a:bodyPr rtlCol="0" anchor="ctr"/>
+          <a:lstStyle/>
+          <a:p>
+            <a:pPr algn="ctr"/>
+            <a:r>
+              <a:rPr lang="en-SG" dirty="0">
+                <a:solidFill>
+                  <a:schemeClr val="tx1"/>
+                </a:solidFill>
+              </a:rPr>
+              <a:t>User Query</a:t>
+            </a:r>
+          </a:p>
+        </p:txBody>
+      </p:sp>
     </p:spTree>
     <p:extLst>
       <p:ext uri="{BB962C8B-B14F-4D97-AF65-F5344CB8AC3E}">

</xml_diff>